<commit_message>
Add PDF slides for knitr
</commit_message>
<xml_diff>
--- a/05_ReproducibleResearch/knitr/knitr.pptx
+++ b/05_ReproducibleResearch/knitr/knitr.pptx
@@ -228,7 +228,7 @@
           </a:lstStyle>
           <a:p>
             <a:fld id="{CC2F67DC-D9EB-9842-AACC-87EB4FF362D8}" type="datetimeFigureOut">
-              <a:t>9/19/13</a:t>
+              <a:t>2/12/14</a:t>
             </a:fld>
             <a:endParaRPr lang="en-US"/>
           </a:p>
@@ -3829,7 +3829,7 @@
           <a:p>
             <a:fld id="{0E5D33D5-4C79-2644-97D0-9A6C8983A5BE}" type="datetimeFigureOut">
               <a:rPr lang="en-US" smtClean="0"/>
-              <a:t>9/19/13</a:t>
+              <a:t>2/12/14</a:t>
             </a:fld>
             <a:endParaRPr lang="en-US"/>
           </a:p>
@@ -3999,7 +3999,7 @@
           <a:p>
             <a:fld id="{0E5D33D5-4C79-2644-97D0-9A6C8983A5BE}" type="datetimeFigureOut">
               <a:rPr lang="en-US" smtClean="0"/>
-              <a:t>9/19/13</a:t>
+              <a:t>2/12/14</a:t>
             </a:fld>
             <a:endParaRPr lang="en-US"/>
           </a:p>
@@ -4179,7 +4179,7 @@
           <a:p>
             <a:fld id="{0E5D33D5-4C79-2644-97D0-9A6C8983A5BE}" type="datetimeFigureOut">
               <a:rPr lang="en-US" smtClean="0"/>
-              <a:t>9/19/13</a:t>
+              <a:t>2/12/14</a:t>
             </a:fld>
             <a:endParaRPr lang="en-US"/>
           </a:p>
@@ -4349,7 +4349,7 @@
           <a:p>
             <a:fld id="{0E5D33D5-4C79-2644-97D0-9A6C8983A5BE}" type="datetimeFigureOut">
               <a:rPr lang="en-US" smtClean="0"/>
-              <a:t>9/19/13</a:t>
+              <a:t>2/12/14</a:t>
             </a:fld>
             <a:endParaRPr lang="en-US"/>
           </a:p>
@@ -4595,7 +4595,7 @@
           <a:p>
             <a:fld id="{0E5D33D5-4C79-2644-97D0-9A6C8983A5BE}" type="datetimeFigureOut">
               <a:rPr lang="en-US" smtClean="0"/>
-              <a:t>9/19/13</a:t>
+              <a:t>2/12/14</a:t>
             </a:fld>
             <a:endParaRPr lang="en-US"/>
           </a:p>
@@ -4883,7 +4883,7 @@
           <a:p>
             <a:fld id="{0E5D33D5-4C79-2644-97D0-9A6C8983A5BE}" type="datetimeFigureOut">
               <a:rPr lang="en-US" smtClean="0"/>
-              <a:t>9/19/13</a:t>
+              <a:t>2/12/14</a:t>
             </a:fld>
             <a:endParaRPr lang="en-US"/>
           </a:p>
@@ -5310,7 +5310,7 @@
           <a:p>
             <a:fld id="{0E5D33D5-4C79-2644-97D0-9A6C8983A5BE}" type="datetimeFigureOut">
               <a:rPr lang="en-US" smtClean="0"/>
-              <a:t>9/19/13</a:t>
+              <a:t>2/12/14</a:t>
             </a:fld>
             <a:endParaRPr lang="en-US"/>
           </a:p>
@@ -5428,7 +5428,7 @@
           <a:p>
             <a:fld id="{0E5D33D5-4C79-2644-97D0-9A6C8983A5BE}" type="datetimeFigureOut">
               <a:rPr lang="en-US" smtClean="0"/>
-              <a:t>9/19/13</a:t>
+              <a:t>2/12/14</a:t>
             </a:fld>
             <a:endParaRPr lang="en-US"/>
           </a:p>
@@ -5523,7 +5523,7 @@
           <a:p>
             <a:fld id="{0E5D33D5-4C79-2644-97D0-9A6C8983A5BE}" type="datetimeFigureOut">
               <a:rPr lang="en-US" smtClean="0"/>
-              <a:t>9/19/13</a:t>
+              <a:t>2/12/14</a:t>
             </a:fld>
             <a:endParaRPr lang="en-US"/>
           </a:p>
@@ -5800,7 +5800,7 @@
           <a:p>
             <a:fld id="{0E5D33D5-4C79-2644-97D0-9A6C8983A5BE}" type="datetimeFigureOut">
               <a:rPr lang="en-US" smtClean="0"/>
-              <a:t>9/19/13</a:t>
+              <a:t>2/12/14</a:t>
             </a:fld>
             <a:endParaRPr lang="en-US"/>
           </a:p>
@@ -6053,7 +6053,7 @@
           <a:p>
             <a:fld id="{0E5D33D5-4C79-2644-97D0-9A6C8983A5BE}" type="datetimeFigureOut">
               <a:rPr lang="en-US" smtClean="0"/>
-              <a:t>9/19/13</a:t>
+              <a:t>2/12/14</a:t>
             </a:fld>
             <a:endParaRPr lang="en-US"/>
           </a:p>
@@ -6266,7 +6266,7 @@
           <a:p>
             <a:fld id="{0E5D33D5-4C79-2644-97D0-9A6C8983A5BE}" type="datetimeFigureOut">
               <a:rPr lang="en-US" smtClean="0"/>
-              <a:t>9/19/13</a:t>
+              <a:t>2/12/14</a:t>
             </a:fld>
             <a:endParaRPr lang="en-US"/>
           </a:p>
@@ -6682,14 +6682,31 @@
         </p:nvSpPr>
         <p:spPr/>
         <p:txBody>
-          <a:bodyPr/>
-          <a:lstStyle/>
-          <a:p>
-            <a:r>
-              <a:rPr lang="en-US" dirty="0" smtClean="0"/>
-              <a:t>Computing for Data Analysis</a:t>
-            </a:r>
+          <a:bodyPr>
+            <a:normAutofit fontScale="62500" lnSpcReduction="20000"/>
+          </a:bodyPr>
+          <a:lstStyle/>
+          <a:p>
+            <a:r>
+              <a:rPr lang="en-US" sz="3800" dirty="0" smtClean="0"/>
+              <a:t>Reproducible Research</a:t>
+            </a:r>
+          </a:p>
+          <a:p>
             <a:endParaRPr lang="en-US" dirty="0"/>
+          </a:p>
+          <a:p>
+            <a:r>
+              <a:rPr lang="en-US" i="1" dirty="0"/>
+              <a:t>Roger D. Peng, Associate Professor of Biostatistics</a:t>
+            </a:r>
+          </a:p>
+          <a:p>
+            <a:r>
+              <a:rPr lang="en-US" i="1" dirty="0"/>
+              <a:t>Johns Hopkins Bloomberg School of Public Health</a:t>
+            </a:r>
+            <a:endParaRPr lang="en-US" i="1" dirty="0"/>
           </a:p>
         </p:txBody>
       </p:sp>

</xml_diff>